<commit_message>
Add info about convolution, pooling and dropout
</commit_message>
<xml_diff>
--- a/presentations/OCR.pptx
+++ b/presentations/OCR.pptx
@@ -10,6 +10,9 @@
     <p:sldId id="259" r:id="rId4"/>
     <p:sldId id="260" r:id="rId5"/>
     <p:sldId id="261" r:id="rId6"/>
+    <p:sldId id="262" r:id="rId7"/>
+    <p:sldId id="263" r:id="rId8"/>
+    <p:sldId id="264" r:id="rId9"/>
   </p:sldIdLst>
   <p:sldSz cx="9144000" cy="6858000" type="screen4x3"/>
   <p:notesSz cx="6858000" cy="9144000"/>
@@ -299,7 +302,7 @@
           <a:p>
             <a:fld id="{F2853615-BFDE-46DE-814C-47EC6EF6D371}" type="datetimeFigureOut">
               <a:rPr lang="el-GR" smtClean="0"/>
-              <a:t>3/6/2018</a:t>
+              <a:t>2/3/2019</a:t>
             </a:fld>
             <a:endParaRPr lang="el-GR"/>
           </a:p>
@@ -499,7 +502,7 @@
           <a:p>
             <a:fld id="{F2853615-BFDE-46DE-814C-47EC6EF6D371}" type="datetimeFigureOut">
               <a:rPr lang="el-GR" smtClean="0"/>
-              <a:t>3/6/2018</a:t>
+              <a:t>2/3/2019</a:t>
             </a:fld>
             <a:endParaRPr lang="el-GR"/>
           </a:p>
@@ -674,7 +677,7 @@
           <a:p>
             <a:fld id="{F2853615-BFDE-46DE-814C-47EC6EF6D371}" type="datetimeFigureOut">
               <a:rPr lang="el-GR" smtClean="0"/>
-              <a:t>3/6/2018</a:t>
+              <a:t>2/3/2019</a:t>
             </a:fld>
             <a:endParaRPr lang="el-GR"/>
           </a:p>
@@ -839,7 +842,7 @@
           <a:p>
             <a:fld id="{F2853615-BFDE-46DE-814C-47EC6EF6D371}" type="datetimeFigureOut">
               <a:rPr lang="el-GR" smtClean="0"/>
-              <a:t>3/6/2018</a:t>
+              <a:t>2/3/2019</a:t>
             </a:fld>
             <a:endParaRPr lang="el-GR"/>
           </a:p>
@@ -978,7 +981,7 @@
           <a:p>
             <a:fld id="{F2853615-BFDE-46DE-814C-47EC6EF6D371}" type="datetimeFigureOut">
               <a:rPr lang="el-GR" smtClean="0"/>
-              <a:t>3/6/2018</a:t>
+              <a:t>2/3/2019</a:t>
             </a:fld>
             <a:endParaRPr lang="el-GR"/>
           </a:p>
@@ -1296,7 +1299,7 @@
           <a:p>
             <a:fld id="{F2853615-BFDE-46DE-814C-47EC6EF6D371}" type="datetimeFigureOut">
               <a:rPr lang="el-GR" smtClean="0"/>
-              <a:t>3/6/2018</a:t>
+              <a:t>2/3/2019</a:t>
             </a:fld>
             <a:endParaRPr lang="el-GR"/>
           </a:p>
@@ -1762,7 +1765,7 @@
           <a:p>
             <a:fld id="{F2853615-BFDE-46DE-814C-47EC6EF6D371}" type="datetimeFigureOut">
               <a:rPr lang="el-GR" smtClean="0"/>
-              <a:t>3/6/2018</a:t>
+              <a:t>2/3/2019</a:t>
             </a:fld>
             <a:endParaRPr lang="el-GR"/>
           </a:p>
@@ -1910,7 +1913,7 @@
           <a:p>
             <a:fld id="{F2853615-BFDE-46DE-814C-47EC6EF6D371}" type="datetimeFigureOut">
               <a:rPr lang="el-GR" smtClean="0"/>
-              <a:t>3/6/2018</a:t>
+              <a:t>2/3/2019</a:t>
             </a:fld>
             <a:endParaRPr lang="el-GR"/>
           </a:p>
@@ -2000,7 +2003,7 @@
           <a:p>
             <a:fld id="{F2853615-BFDE-46DE-814C-47EC6EF6D371}" type="datetimeFigureOut">
               <a:rPr lang="el-GR" smtClean="0"/>
-              <a:t>3/6/2018</a:t>
+              <a:t>2/3/2019</a:t>
             </a:fld>
             <a:endParaRPr lang="el-GR"/>
           </a:p>
@@ -2274,7 +2277,7 @@
           <a:p>
             <a:fld id="{F2853615-BFDE-46DE-814C-47EC6EF6D371}" type="datetimeFigureOut">
               <a:rPr lang="el-GR" smtClean="0"/>
-              <a:t>3/6/2018</a:t>
+              <a:t>2/3/2019</a:t>
             </a:fld>
             <a:endParaRPr lang="el-GR"/>
           </a:p>
@@ -2579,7 +2582,7 @@
           <a:p>
             <a:fld id="{F2853615-BFDE-46DE-814C-47EC6EF6D371}" type="datetimeFigureOut">
               <a:rPr lang="el-GR" smtClean="0"/>
-              <a:t>3/6/2018</a:t>
+              <a:t>2/3/2019</a:t>
             </a:fld>
             <a:endParaRPr lang="el-GR"/>
           </a:p>
@@ -2877,7 +2880,7 @@
           <a:p>
             <a:fld id="{F2853615-BFDE-46DE-814C-47EC6EF6D371}" type="datetimeFigureOut">
               <a:rPr lang="el-GR" smtClean="0"/>
-              <a:t>3/6/2018</a:t>
+              <a:t>2/3/2019</a:t>
             </a:fld>
             <a:endParaRPr lang="el-GR"/>
           </a:p>
@@ -3773,11 +3776,7 @@
           <a:p>
             <a:r>
               <a:rPr lang="en-US" dirty="0" smtClean="0"/>
-              <a:t>3-layer fully </a:t>
-            </a:r>
-            <a:r>
-              <a:rPr lang="en-US" dirty="0" smtClean="0"/>
-              <a:t>connected</a:t>
+              <a:t>3-layer fully connected</a:t>
             </a:r>
           </a:p>
           <a:p>
@@ -3791,7 +3790,6 @@
               <a:rPr lang="en-US" dirty="0" smtClean="0"/>
               <a:t>	network</a:t>
             </a:r>
-            <a:endParaRPr lang="en-US" dirty="0" smtClean="0"/>
           </a:p>
           <a:p>
             <a:r>
@@ -4012,11 +4010,7 @@
             </a:r>
             <a:r>
               <a:rPr lang="en-US" smtClean="0"/>
-              <a:t>using </a:t>
-            </a:r>
-            <a:r>
-              <a:rPr lang="en-US" smtClean="0"/>
-              <a:t>CNN</a:t>
+              <a:t>using CNN</a:t>
             </a:r>
             <a:endParaRPr lang="el-GR" dirty="0"/>
           </a:p>
@@ -4041,14 +4035,12 @@
               <a:rPr lang="en-US" dirty="0" smtClean="0"/>
               <a:t>2 Conv. layers</a:t>
             </a:r>
-            <a:endParaRPr lang="en-US" dirty="0" smtClean="0"/>
           </a:p>
           <a:p>
             <a:r>
               <a:rPr lang="en-US" dirty="0" smtClean="0"/>
               <a:t>1 Pooling layer</a:t>
             </a:r>
-            <a:endParaRPr lang="en-US" dirty="0" smtClean="0"/>
           </a:p>
           <a:p>
             <a:r>
@@ -4099,11 +4091,7 @@
             </a:r>
             <a:r>
               <a:rPr lang="en-GB" sz="1200" dirty="0"/>
-              <a:t>: </a:t>
-            </a:r>
-            <a:r>
-              <a:rPr lang="en-GB" sz="1200" dirty="0"/>
-              <a:t>https://towardsdatascience.com/a-simple-2d-cnn-for-mnist-digit-recognition-a998dbc1e79a</a:t>
+              <a:t>: https://towardsdatascience.com/a-simple-2d-cnn-for-mnist-digit-recognition-a998dbc1e79a</a:t>
             </a:r>
             <a:endParaRPr lang="el-GR" sz="1200" dirty="0"/>
           </a:p>
@@ -4369,6 +4357,654 @@
     <p:extLst>
       <p:ext uri="{BB962C8B-B14F-4D97-AF65-F5344CB8AC3E}">
         <p14:creationId xmlns:p14="http://schemas.microsoft.com/office/powerpoint/2010/main" val="1948359509"/>
+      </p:ext>
+    </p:extLst>
+  </p:cSld>
+  <p:clrMapOvr>
+    <a:masterClrMapping/>
+  </p:clrMapOvr>
+  <p:timing>
+    <p:tnLst>
+      <p:par>
+        <p:cTn id="1" dur="indefinite" restart="never" nodeType="tmRoot"/>
+      </p:par>
+    </p:tnLst>
+  </p:timing>
+</p:sld>
+</file>
+
+<file path=ppt/slides/slide6.xml><?xml version="1.0" encoding="utf-8"?>
+<p:sld xmlns:a="http://schemas.openxmlformats.org/drawingml/2006/main" xmlns:r="http://schemas.openxmlformats.org/officeDocument/2006/relationships" xmlns:p="http://schemas.openxmlformats.org/presentationml/2006/main">
+  <p:cSld>
+    <p:spTree>
+      <p:nvGrpSpPr>
+        <p:cNvPr id="1" name=""/>
+        <p:cNvGrpSpPr/>
+        <p:nvPr/>
+      </p:nvGrpSpPr>
+      <p:grpSpPr>
+        <a:xfrm>
+          <a:off x="0" y="0"/>
+          <a:ext cx="0" cy="0"/>
+          <a:chOff x="0" y="0"/>
+          <a:chExt cx="0" cy="0"/>
+        </a:xfrm>
+      </p:grpSpPr>
+      <p:sp>
+        <p:nvSpPr>
+          <p:cNvPr id="2" name="Τίτλος 1"/>
+          <p:cNvSpPr>
+            <a:spLocks noGrp="1"/>
+          </p:cNvSpPr>
+          <p:nvPr>
+            <p:ph type="title"/>
+          </p:nvPr>
+        </p:nvSpPr>
+        <p:spPr/>
+        <p:txBody>
+          <a:bodyPr/>
+          <a:lstStyle/>
+          <a:p>
+            <a:r>
+              <a:rPr lang="en-US" dirty="0" smtClean="0"/>
+              <a:t>Convolution</a:t>
+            </a:r>
+            <a:endParaRPr lang="el-GR" dirty="0"/>
+          </a:p>
+        </p:txBody>
+      </p:sp>
+      <p:sp>
+        <p:nvSpPr>
+          <p:cNvPr id="3" name="Θέση περιεχομένου 2"/>
+          <p:cNvSpPr>
+            <a:spLocks noGrp="1"/>
+          </p:cNvSpPr>
+          <p:nvPr>
+            <p:ph idx="1"/>
+          </p:nvPr>
+        </p:nvSpPr>
+        <p:spPr/>
+        <p:txBody>
+          <a:bodyPr/>
+          <a:lstStyle/>
+          <a:p>
+            <a:r>
+              <a:rPr lang="en-US" dirty="0"/>
+              <a:t>Apply kernel to data to provide transformation</a:t>
+            </a:r>
+          </a:p>
+          <a:p>
+            <a:r>
+              <a:rPr lang="en-US" dirty="0"/>
+              <a:t>Use padding to preserve input dimensions</a:t>
+            </a:r>
+          </a:p>
+        </p:txBody>
+      </p:sp>
+      <p:sp>
+        <p:nvSpPr>
+          <p:cNvPr id="5" name="TextBox 4"/>
+          <p:cNvSpPr txBox="1"/>
+          <p:nvPr/>
+        </p:nvSpPr>
+        <p:spPr>
+          <a:xfrm>
+            <a:off x="136307" y="6381328"/>
+            <a:ext cx="7460029" cy="276999"/>
+          </a:xfrm>
+          <a:prstGeom prst="rect">
+            <a:avLst/>
+          </a:prstGeom>
+          <a:noFill/>
+        </p:spPr>
+        <p:txBody>
+          <a:bodyPr wrap="square" rtlCol="0">
+            <a:spAutoFit/>
+          </a:bodyPr>
+          <a:lstStyle/>
+          <a:p>
+            <a:r>
+              <a:rPr lang="en-GB" sz="1200" dirty="0" smtClean="0"/>
+              <a:t>Source</a:t>
+            </a:r>
+            <a:r>
+              <a:rPr lang="en-GB" sz="1200" dirty="0"/>
+              <a:t>: </a:t>
+            </a:r>
+            <a:r>
+              <a:rPr lang="en-GB" sz="1200" dirty="0"/>
+              <a:t>http://cs231n.github.io/convolutional-networks/</a:t>
+            </a:r>
+            <a:endParaRPr lang="el-GR" sz="1200" dirty="0"/>
+          </a:p>
+        </p:txBody>
+      </p:sp>
+      <p:pic>
+        <p:nvPicPr>
+          <p:cNvPr id="1026" name="Picture 2" descr="http://intellabs.github.io/ParallelJavaScript/img/convolution.png"/>
+          <p:cNvPicPr>
+            <a:picLocks noChangeAspect="1" noChangeArrowheads="1"/>
+          </p:cNvPicPr>
+          <p:nvPr/>
+        </p:nvPicPr>
+        <p:blipFill>
+          <a:blip r:embed="rId2">
+            <a:extLst>
+              <a:ext uri="{BEBA8EAE-BF5A-486C-A8C5-ECC9F3942E4B}">
+                <a14:imgProps xmlns:a14="http://schemas.microsoft.com/office/drawing/2010/main">
+                  <a14:imgLayer r:embed="rId3">
+                    <a14:imgEffect>
+                      <a14:sharpenSoften amount="50000"/>
+                    </a14:imgEffect>
+                  </a14:imgLayer>
+                </a14:imgProps>
+              </a:ext>
+              <a:ext uri="{28A0092B-C50C-407E-A947-70E740481C1C}">
+                <a14:useLocalDpi xmlns:a14="http://schemas.microsoft.com/office/drawing/2010/main" val="0"/>
+              </a:ext>
+            </a:extLst>
+          </a:blip>
+          <a:srcRect/>
+          <a:stretch>
+            <a:fillRect/>
+          </a:stretch>
+        </p:blipFill>
+        <p:spPr bwMode="auto">
+          <a:xfrm>
+            <a:off x="611560" y="3161713"/>
+            <a:ext cx="4614710" cy="2776434"/>
+          </a:xfrm>
+          <a:prstGeom prst="rect">
+            <a:avLst/>
+          </a:prstGeom>
+          <a:noFill/>
+          <a:extLst>
+            <a:ext uri="{909E8E84-426E-40DD-AFC4-6F175D3DCCD1}">
+              <a14:hiddenFill xmlns:a14="http://schemas.microsoft.com/office/drawing/2010/main">
+                <a:solidFill>
+                  <a:srgbClr val="FFFFFF"/>
+                </a:solidFill>
+              </a14:hiddenFill>
+            </a:ext>
+          </a:extLst>
+        </p:spPr>
+      </p:pic>
+      <p:pic>
+        <p:nvPicPr>
+          <p:cNvPr id="1027" name="Picture 3"/>
+          <p:cNvPicPr>
+            <a:picLocks noChangeAspect="1" noChangeArrowheads="1"/>
+          </p:cNvPicPr>
+          <p:nvPr/>
+        </p:nvPicPr>
+        <p:blipFill rotWithShape="1">
+          <a:blip r:embed="rId4">
+            <a:extLst>
+              <a:ext uri="{28A0092B-C50C-407E-A947-70E740481C1C}">
+                <a14:useLocalDpi xmlns:a14="http://schemas.microsoft.com/office/drawing/2010/main" val="0"/>
+              </a:ext>
+            </a:extLst>
+          </a:blip>
+          <a:srcRect l="6124" r="9961"/>
+          <a:stretch/>
+        </p:blipFill>
+        <p:spPr bwMode="auto">
+          <a:xfrm>
+            <a:off x="5836209" y="3036378"/>
+            <a:ext cx="2624223" cy="3027104"/>
+          </a:xfrm>
+          <a:prstGeom prst="rect">
+            <a:avLst/>
+          </a:prstGeom>
+          <a:noFill/>
+          <a:ln>
+            <a:noFill/>
+          </a:ln>
+          <a:effectLst/>
+          <a:extLst>
+            <a:ext uri="{909E8E84-426E-40DD-AFC4-6F175D3DCCD1}">
+              <a14:hiddenFill xmlns:a14="http://schemas.microsoft.com/office/drawing/2010/main">
+                <a:solidFill>
+                  <a:schemeClr val="accent1"/>
+                </a:solidFill>
+              </a14:hiddenFill>
+            </a:ext>
+            <a:ext uri="{91240B29-F687-4F45-9708-019B960494DF}">
+              <a14:hiddenLine xmlns:a14="http://schemas.microsoft.com/office/drawing/2010/main" w="9525">
+                <a:solidFill>
+                  <a:schemeClr val="tx1"/>
+                </a:solidFill>
+                <a:miter lim="800000"/>
+                <a:headEnd/>
+                <a:tailEnd/>
+              </a14:hiddenLine>
+            </a:ext>
+            <a:ext uri="{AF507438-7753-43E0-B8FC-AC1667EBCBE1}">
+              <a14:hiddenEffects xmlns:a14="http://schemas.microsoft.com/office/drawing/2010/main">
+                <a:effectLst>
+                  <a:outerShdw dist="35921" dir="2700000" algn="ctr" rotWithShape="0">
+                    <a:schemeClr val="bg2"/>
+                  </a:outerShdw>
+                </a:effectLst>
+              </a14:hiddenEffects>
+            </a:ext>
+          </a:extLst>
+        </p:spPr>
+      </p:pic>
+    </p:spTree>
+    <p:extLst>
+      <p:ext uri="{BB962C8B-B14F-4D97-AF65-F5344CB8AC3E}">
+        <p14:creationId xmlns:p14="http://schemas.microsoft.com/office/powerpoint/2010/main" val="2598497943"/>
+      </p:ext>
+    </p:extLst>
+  </p:cSld>
+  <p:clrMapOvr>
+    <a:masterClrMapping/>
+  </p:clrMapOvr>
+  <p:timing>
+    <p:tnLst>
+      <p:par>
+        <p:cTn id="1" dur="indefinite" restart="never" nodeType="tmRoot"/>
+      </p:par>
+    </p:tnLst>
+  </p:timing>
+</p:sld>
+</file>
+
+<file path=ppt/slides/slide7.xml><?xml version="1.0" encoding="utf-8"?>
+<p:sld xmlns:a="http://schemas.openxmlformats.org/drawingml/2006/main" xmlns:r="http://schemas.openxmlformats.org/officeDocument/2006/relationships" xmlns:p="http://schemas.openxmlformats.org/presentationml/2006/main">
+  <p:cSld>
+    <p:spTree>
+      <p:nvGrpSpPr>
+        <p:cNvPr id="1" name=""/>
+        <p:cNvGrpSpPr/>
+        <p:nvPr/>
+      </p:nvGrpSpPr>
+      <p:grpSpPr>
+        <a:xfrm>
+          <a:off x="0" y="0"/>
+          <a:ext cx="0" cy="0"/>
+          <a:chOff x="0" y="0"/>
+          <a:chExt cx="0" cy="0"/>
+        </a:xfrm>
+      </p:grpSpPr>
+      <p:sp>
+        <p:nvSpPr>
+          <p:cNvPr id="2" name="Τίτλος 1"/>
+          <p:cNvSpPr>
+            <a:spLocks noGrp="1"/>
+          </p:cNvSpPr>
+          <p:nvPr>
+            <p:ph type="title"/>
+          </p:nvPr>
+        </p:nvSpPr>
+        <p:spPr/>
+        <p:txBody>
+          <a:bodyPr/>
+          <a:lstStyle/>
+          <a:p>
+            <a:r>
+              <a:rPr lang="en-US" dirty="0" smtClean="0"/>
+              <a:t>Pooling</a:t>
+            </a:r>
+            <a:endParaRPr lang="el-GR" dirty="0"/>
+          </a:p>
+        </p:txBody>
+      </p:sp>
+      <p:sp>
+        <p:nvSpPr>
+          <p:cNvPr id="3" name="Θέση περιεχομένου 2"/>
+          <p:cNvSpPr>
+            <a:spLocks noGrp="1"/>
+          </p:cNvSpPr>
+          <p:nvPr>
+            <p:ph idx="1"/>
+          </p:nvPr>
+        </p:nvSpPr>
+        <p:spPr/>
+        <p:txBody>
+          <a:bodyPr/>
+          <a:lstStyle/>
+          <a:p>
+            <a:r>
+              <a:rPr lang="en-US" dirty="0" smtClean="0"/>
+              <a:t>Reduce dimensionality, i.e. reduce number </a:t>
+            </a:r>
+            <a:r>
+              <a:rPr lang="en-US" dirty="0"/>
+              <a:t>of </a:t>
+            </a:r>
+            <a:r>
+              <a:rPr lang="en-US" dirty="0" smtClean="0"/>
+              <a:t>parameters</a:t>
+            </a:r>
+          </a:p>
+          <a:p>
+            <a:r>
+              <a:rPr lang="en-US" dirty="0" smtClean="0"/>
+              <a:t>Controls </a:t>
+            </a:r>
+            <a:r>
+              <a:rPr lang="en-US" dirty="0" err="1" smtClean="0"/>
+              <a:t>overfitting</a:t>
+            </a:r>
+            <a:endParaRPr lang="en-US" dirty="0"/>
+          </a:p>
+          <a:p>
+            <a:r>
+              <a:rPr lang="en-US" dirty="0" smtClean="0"/>
+              <a:t>Different ways of pooling, e.g. max</a:t>
+            </a:r>
+            <a:endParaRPr lang="en-US" dirty="0" smtClean="0"/>
+          </a:p>
+        </p:txBody>
+      </p:sp>
+      <p:sp>
+        <p:nvSpPr>
+          <p:cNvPr id="5" name="TextBox 4"/>
+          <p:cNvSpPr txBox="1"/>
+          <p:nvPr/>
+        </p:nvSpPr>
+        <p:spPr>
+          <a:xfrm>
+            <a:off x="136307" y="6381328"/>
+            <a:ext cx="8180109" cy="276999"/>
+          </a:xfrm>
+          <a:prstGeom prst="rect">
+            <a:avLst/>
+          </a:prstGeom>
+          <a:noFill/>
+        </p:spPr>
+        <p:txBody>
+          <a:bodyPr wrap="square" rtlCol="0">
+            <a:spAutoFit/>
+          </a:bodyPr>
+          <a:lstStyle/>
+          <a:p>
+            <a:r>
+              <a:rPr lang="en-GB" sz="1200" dirty="0" smtClean="0"/>
+              <a:t>Source</a:t>
+            </a:r>
+            <a:r>
+              <a:rPr lang="en-GB" sz="1200" dirty="0"/>
+              <a:t>: </a:t>
+            </a:r>
+            <a:r>
+              <a:rPr lang="en-GB" sz="1200" dirty="0"/>
+              <a:t>https://medium.freecodecamp.org/an-intuitive-guide-to-convolutional-neural-networks-260c2de0a050</a:t>
+            </a:r>
+            <a:endParaRPr lang="el-GR" sz="1200" dirty="0"/>
+          </a:p>
+        </p:txBody>
+      </p:sp>
+      <p:pic>
+        <p:nvPicPr>
+          <p:cNvPr id="2052" name="Picture 4"/>
+          <p:cNvPicPr>
+            <a:picLocks noChangeAspect="1" noChangeArrowheads="1"/>
+          </p:cNvPicPr>
+          <p:nvPr/>
+        </p:nvPicPr>
+        <p:blipFill>
+          <a:blip r:embed="rId2">
+            <a:extLst>
+              <a:ext uri="{BEBA8EAE-BF5A-486C-A8C5-ECC9F3942E4B}">
+                <a14:imgProps xmlns:a14="http://schemas.microsoft.com/office/drawing/2010/main">
+                  <a14:imgLayer r:embed="rId3">
+                    <a14:imgEffect>
+                      <a14:sharpenSoften amount="25000"/>
+                    </a14:imgEffect>
+                  </a14:imgLayer>
+                </a14:imgProps>
+              </a:ext>
+              <a:ext uri="{28A0092B-C50C-407E-A947-70E740481C1C}">
+                <a14:useLocalDpi xmlns:a14="http://schemas.microsoft.com/office/drawing/2010/main" val="0"/>
+              </a:ext>
+            </a:extLst>
+          </a:blip>
+          <a:srcRect/>
+          <a:stretch>
+            <a:fillRect/>
+          </a:stretch>
+        </p:blipFill>
+        <p:spPr bwMode="auto">
+          <a:xfrm>
+            <a:off x="1411304" y="3368016"/>
+            <a:ext cx="6550226" cy="2362378"/>
+          </a:xfrm>
+          <a:prstGeom prst="rect">
+            <a:avLst/>
+          </a:prstGeom>
+          <a:noFill/>
+          <a:ln>
+            <a:noFill/>
+          </a:ln>
+          <a:effectLst/>
+          <a:extLst>
+            <a:ext uri="{909E8E84-426E-40DD-AFC4-6F175D3DCCD1}">
+              <a14:hiddenFill xmlns:a14="http://schemas.microsoft.com/office/drawing/2010/main">
+                <a:solidFill>
+                  <a:schemeClr val="accent1"/>
+                </a:solidFill>
+              </a14:hiddenFill>
+            </a:ext>
+            <a:ext uri="{91240B29-F687-4F45-9708-019B960494DF}">
+              <a14:hiddenLine xmlns:a14="http://schemas.microsoft.com/office/drawing/2010/main" w="9525">
+                <a:solidFill>
+                  <a:schemeClr val="tx1"/>
+                </a:solidFill>
+                <a:miter lim="800000"/>
+                <a:headEnd/>
+                <a:tailEnd/>
+              </a14:hiddenLine>
+            </a:ext>
+            <a:ext uri="{AF507438-7753-43E0-B8FC-AC1667EBCBE1}">
+              <a14:hiddenEffects xmlns:a14="http://schemas.microsoft.com/office/drawing/2010/main">
+                <a:effectLst>
+                  <a:outerShdw dist="35921" dir="2700000" algn="ctr" rotWithShape="0">
+                    <a:schemeClr val="bg2"/>
+                  </a:outerShdw>
+                </a:effectLst>
+              </a14:hiddenEffects>
+            </a:ext>
+          </a:extLst>
+        </p:spPr>
+      </p:pic>
+    </p:spTree>
+    <p:extLst>
+      <p:ext uri="{BB962C8B-B14F-4D97-AF65-F5344CB8AC3E}">
+        <p14:creationId xmlns:p14="http://schemas.microsoft.com/office/powerpoint/2010/main" val="1902928121"/>
+      </p:ext>
+    </p:extLst>
+  </p:cSld>
+  <p:clrMapOvr>
+    <a:masterClrMapping/>
+  </p:clrMapOvr>
+  <p:timing>
+    <p:tnLst>
+      <p:par>
+        <p:cTn id="1" dur="indefinite" restart="never" nodeType="tmRoot"/>
+      </p:par>
+    </p:tnLst>
+  </p:timing>
+</p:sld>
+</file>
+
+<file path=ppt/slides/slide8.xml><?xml version="1.0" encoding="utf-8"?>
+<p:sld xmlns:a="http://schemas.openxmlformats.org/drawingml/2006/main" xmlns:r="http://schemas.openxmlformats.org/officeDocument/2006/relationships" xmlns:p="http://schemas.openxmlformats.org/presentationml/2006/main">
+  <p:cSld>
+    <p:spTree>
+      <p:nvGrpSpPr>
+        <p:cNvPr id="1" name=""/>
+        <p:cNvGrpSpPr/>
+        <p:nvPr/>
+      </p:nvGrpSpPr>
+      <p:grpSpPr>
+        <a:xfrm>
+          <a:off x="0" y="0"/>
+          <a:ext cx="0" cy="0"/>
+          <a:chOff x="0" y="0"/>
+          <a:chExt cx="0" cy="0"/>
+        </a:xfrm>
+      </p:grpSpPr>
+      <p:sp>
+        <p:nvSpPr>
+          <p:cNvPr id="2" name="Τίτλος 1"/>
+          <p:cNvSpPr>
+            <a:spLocks noGrp="1"/>
+          </p:cNvSpPr>
+          <p:nvPr>
+            <p:ph type="title"/>
+          </p:nvPr>
+        </p:nvSpPr>
+        <p:spPr/>
+        <p:txBody>
+          <a:bodyPr/>
+          <a:lstStyle/>
+          <a:p>
+            <a:r>
+              <a:rPr lang="en-US" dirty="0" smtClean="0"/>
+              <a:t>Dropout</a:t>
+            </a:r>
+            <a:endParaRPr lang="el-GR" dirty="0"/>
+          </a:p>
+        </p:txBody>
+      </p:sp>
+      <p:sp>
+        <p:nvSpPr>
+          <p:cNvPr id="3" name="Θέση περιεχομένου 2"/>
+          <p:cNvSpPr>
+            <a:spLocks noGrp="1"/>
+          </p:cNvSpPr>
+          <p:nvPr>
+            <p:ph idx="1"/>
+          </p:nvPr>
+        </p:nvSpPr>
+        <p:spPr/>
+        <p:txBody>
+          <a:bodyPr/>
+          <a:lstStyle/>
+          <a:p>
+            <a:r>
+              <a:rPr lang="en-US" dirty="0" smtClean="0"/>
+              <a:t>Drop some nodes for a pass of the algorithm</a:t>
+            </a:r>
+          </a:p>
+          <a:p>
+            <a:r>
+              <a:rPr lang="en-US" dirty="0" smtClean="0"/>
+              <a:t>Avoid overtraining certain nodes</a:t>
+            </a:r>
+            <a:endParaRPr lang="en-US" dirty="0" smtClean="0"/>
+          </a:p>
+        </p:txBody>
+      </p:sp>
+      <p:sp>
+        <p:nvSpPr>
+          <p:cNvPr id="5" name="TextBox 4"/>
+          <p:cNvSpPr txBox="1"/>
+          <p:nvPr/>
+        </p:nvSpPr>
+        <p:spPr>
+          <a:xfrm>
+            <a:off x="136307" y="6381328"/>
+            <a:ext cx="8180109" cy="276999"/>
+          </a:xfrm>
+          <a:prstGeom prst="rect">
+            <a:avLst/>
+          </a:prstGeom>
+          <a:noFill/>
+        </p:spPr>
+        <p:txBody>
+          <a:bodyPr wrap="square" rtlCol="0">
+            <a:spAutoFit/>
+          </a:bodyPr>
+          <a:lstStyle/>
+          <a:p>
+            <a:r>
+              <a:rPr lang="en-GB" sz="1200" dirty="0" smtClean="0"/>
+              <a:t>Source</a:t>
+            </a:r>
+            <a:r>
+              <a:rPr lang="en-GB" sz="1200" dirty="0"/>
+              <a:t>: </a:t>
+            </a:r>
+            <a:r>
+              <a:rPr lang="en-GB" sz="1200" dirty="0"/>
+              <a:t>https://medium.com/p/74334da4bfc5/</a:t>
+            </a:r>
+            <a:endParaRPr lang="el-GR" sz="1200" dirty="0"/>
+          </a:p>
+        </p:txBody>
+      </p:sp>
+      <p:pic>
+        <p:nvPicPr>
+          <p:cNvPr id="3074" name="Picture 2"/>
+          <p:cNvPicPr>
+            <a:picLocks noChangeAspect="1" noChangeArrowheads="1"/>
+          </p:cNvPicPr>
+          <p:nvPr/>
+        </p:nvPicPr>
+        <p:blipFill>
+          <a:blip r:embed="rId2">
+            <a:extLst>
+              <a:ext uri="{28A0092B-C50C-407E-A947-70E740481C1C}">
+                <a14:useLocalDpi xmlns:a14="http://schemas.microsoft.com/office/drawing/2010/main" val="0"/>
+              </a:ext>
+            </a:extLst>
+          </a:blip>
+          <a:srcRect/>
+          <a:stretch>
+            <a:fillRect/>
+          </a:stretch>
+        </p:blipFill>
+        <p:spPr bwMode="auto">
+          <a:xfrm>
+            <a:off x="855767" y="2636912"/>
+            <a:ext cx="7518143" cy="3583343"/>
+          </a:xfrm>
+          <a:prstGeom prst="rect">
+            <a:avLst/>
+          </a:prstGeom>
+          <a:noFill/>
+          <a:ln>
+            <a:noFill/>
+          </a:ln>
+          <a:effectLst/>
+          <a:extLst>
+            <a:ext uri="{909E8E84-426E-40DD-AFC4-6F175D3DCCD1}">
+              <a14:hiddenFill xmlns:a14="http://schemas.microsoft.com/office/drawing/2010/main">
+                <a:solidFill>
+                  <a:schemeClr val="accent1"/>
+                </a:solidFill>
+              </a14:hiddenFill>
+            </a:ext>
+            <a:ext uri="{91240B29-F687-4F45-9708-019B960494DF}">
+              <a14:hiddenLine xmlns:a14="http://schemas.microsoft.com/office/drawing/2010/main" w="9525">
+                <a:solidFill>
+                  <a:schemeClr val="tx1"/>
+                </a:solidFill>
+                <a:miter lim="800000"/>
+                <a:headEnd/>
+                <a:tailEnd/>
+              </a14:hiddenLine>
+            </a:ext>
+            <a:ext uri="{AF507438-7753-43E0-B8FC-AC1667EBCBE1}">
+              <a14:hiddenEffects xmlns:a14="http://schemas.microsoft.com/office/drawing/2010/main">
+                <a:effectLst>
+                  <a:outerShdw dist="35921" dir="2700000" algn="ctr" rotWithShape="0">
+                    <a:schemeClr val="bg2"/>
+                  </a:outerShdw>
+                </a:effectLst>
+              </a14:hiddenEffects>
+            </a:ext>
+          </a:extLst>
+        </p:spPr>
+      </p:pic>
+    </p:spTree>
+    <p:extLst>
+      <p:ext uri="{BB962C8B-B14F-4D97-AF65-F5344CB8AC3E}">
+        <p14:creationId xmlns:p14="http://schemas.microsoft.com/office/powerpoint/2010/main" val="3294389668"/>
       </p:ext>
     </p:extLst>
   </p:cSld>

</xml_diff>